<commit_message>
fix typos in snippets
</commit_message>
<xml_diff>
--- a/Slides.pptx
+++ b/Slides.pptx
@@ -7,10 +7,11 @@
   <p:sldIdLst>
     <p:sldId id="256" r:id="rId2"/>
     <p:sldId id="257" r:id="rId3"/>
-    <p:sldId id="259" r:id="rId4"/>
-    <p:sldId id="258" r:id="rId5"/>
-    <p:sldId id="261" r:id="rId6"/>
-    <p:sldId id="260" r:id="rId7"/>
+    <p:sldId id="262" r:id="rId4"/>
+    <p:sldId id="259" r:id="rId5"/>
+    <p:sldId id="258" r:id="rId6"/>
+    <p:sldId id="261" r:id="rId7"/>
+    <p:sldId id="260" r:id="rId8"/>
   </p:sldIdLst>
   <p:sldSz cx="12192000" cy="6858000"/>
   <p:notesSz cx="6858000" cy="9144000"/>
@@ -6286,8 +6287,23 @@
           <a:p>
             <a:r>
               <a:rPr lang="en-US" dirty="0" smtClean="0"/>
-              <a:t>Barney Consulting, Inc. – Lincoln, NE</a:t>
-            </a:r>
+              <a:t>Barney Consulting, Inc. – Lincoln, </a:t>
+            </a:r>
+            <a:r>
+              <a:rPr lang="en-US" dirty="0" smtClean="0"/>
+              <a:t>NE</a:t>
+            </a:r>
+          </a:p>
+          <a:p>
+            <a:r>
+              <a:rPr lang="en-US" dirty="0" smtClean="0"/>
+              <a:t>Microsoft .NET MVP (C#), </a:t>
+            </a:r>
+            <a:r>
+              <a:rPr lang="en-US" dirty="0" err="1" smtClean="0"/>
+              <a:t>ASPInsider</a:t>
+            </a:r>
+            <a:endParaRPr lang="en-US" dirty="0" smtClean="0"/>
           </a:p>
           <a:p>
             <a:r>
@@ -6421,7 +6437,7 @@
           <a:p>
             <a:r>
               <a:rPr lang="en-US" b="1" dirty="0" smtClean="0"/>
-              <a:t>history</a:t>
+              <a:t>expectations</a:t>
             </a:r>
             <a:endParaRPr lang="en-US" b="1" dirty="0"/>
           </a:p>
@@ -6444,6 +6460,585 @@
           <a:p>
             <a:r>
               <a:rPr lang="en-US" dirty="0" smtClean="0"/>
+              <a:t>I’m not a JavaScript guru</a:t>
+            </a:r>
+          </a:p>
+          <a:p>
+            <a:r>
+              <a:rPr lang="en-US" dirty="0" smtClean="0"/>
+              <a:t>I’ve used other frameworks, but not extensively</a:t>
+            </a:r>
+          </a:p>
+          <a:p>
+            <a:r>
+              <a:rPr lang="en-US" dirty="0" smtClean="0"/>
+              <a:t>Aurelia is not ready for production use </a:t>
+            </a:r>
+            <a:r>
+              <a:rPr lang="en-US" i="1" dirty="0" smtClean="0"/>
+              <a:t>yet</a:t>
+            </a:r>
+            <a:endParaRPr lang="en-US" dirty="0"/>
+          </a:p>
+          <a:p>
+            <a:r>
+              <a:rPr lang="en-US" dirty="0" smtClean="0"/>
+              <a:t>There is too much awesome to cover in one session</a:t>
+            </a:r>
+          </a:p>
+          <a:p>
+            <a:pPr lvl="1"/>
+            <a:r>
+              <a:rPr lang="en-US" dirty="0" smtClean="0"/>
+              <a:t>Easy to get sidetracked, feel free to push me on a tangent</a:t>
+            </a:r>
+          </a:p>
+          <a:p>
+            <a:pPr lvl="1"/>
+            <a:endParaRPr lang="en-US" dirty="0"/>
+          </a:p>
+        </p:txBody>
+      </p:sp>
+    </p:spTree>
+    <p:extLst>
+      <p:ext uri="{BB962C8B-B14F-4D97-AF65-F5344CB8AC3E}">
+        <p14:creationId xmlns:p14="http://schemas.microsoft.com/office/powerpoint/2010/main" val="87755422"/>
+      </p:ext>
+    </p:extLst>
+  </p:cSld>
+  <p:clrMapOvr>
+    <a:masterClrMapping/>
+  </p:clrMapOvr>
+  <mc:AlternateContent xmlns:mc="http://schemas.openxmlformats.org/markup-compatibility/2006">
+    <mc:Choice xmlns:p14="http://schemas.microsoft.com/office/powerpoint/2010/main" Requires="p14">
+      <p:transition spd="slow" p14:dur="800">
+        <p14:flythrough/>
+      </p:transition>
+    </mc:Choice>
+    <mc:Fallback>
+      <p:transition spd="slow">
+        <p:fade/>
+      </p:transition>
+    </mc:Fallback>
+  </mc:AlternateContent>
+  <p:timing>
+    <p:tnLst>
+      <p:par>
+        <p:cTn id="1" dur="indefinite" restart="never" nodeType="tmRoot">
+          <p:childTnLst>
+            <p:seq concurrent="1" nextAc="seek">
+              <p:cTn id="2" dur="indefinite" nodeType="mainSeq">
+                <p:childTnLst>
+                  <p:par>
+                    <p:cTn id="3" fill="hold">
+                      <p:stCondLst>
+                        <p:cond delay="indefinite"/>
+                        <p:cond evt="onBegin" delay="0">
+                          <p:tn val="2"/>
+                        </p:cond>
+                      </p:stCondLst>
+                      <p:childTnLst>
+                        <p:par>
+                          <p:cTn id="4" fill="hold">
+                            <p:stCondLst>
+                              <p:cond delay="0"/>
+                            </p:stCondLst>
+                            <p:childTnLst>
+                              <p:par>
+                                <p:cTn id="5" presetID="12" presetClass="entr" presetSubtype="4" fill="hold" grpId="0" nodeType="withEffect">
+                                  <p:stCondLst>
+                                    <p:cond delay="0"/>
+                                  </p:stCondLst>
+                                  <p:childTnLst>
+                                    <p:set>
+                                      <p:cBhvr>
+                                        <p:cTn id="6" dur="1" fill="hold">
+                                          <p:stCondLst>
+                                            <p:cond delay="0"/>
+                                          </p:stCondLst>
+                                        </p:cTn>
+                                        <p:tgtEl>
+                                          <p:spTgt spid="3">
+                                            <p:txEl>
+                                              <p:pRg st="0" end="0"/>
+                                            </p:txEl>
+                                          </p:spTgt>
+                                        </p:tgtEl>
+                                        <p:attrNameLst>
+                                          <p:attrName>style.visibility</p:attrName>
+                                        </p:attrNameLst>
+                                      </p:cBhvr>
+                                      <p:to>
+                                        <p:strVal val="visible"/>
+                                      </p:to>
+                                    </p:set>
+                                    <p:anim calcmode="lin" valueType="num">
+                                      <p:cBhvr additive="base">
+                                        <p:cTn id="7" dur="500"/>
+                                        <p:tgtEl>
+                                          <p:spTgt spid="3">
+                                            <p:txEl>
+                                              <p:pRg st="0" end="0"/>
+                                            </p:txEl>
+                                          </p:spTgt>
+                                        </p:tgtEl>
+                                        <p:attrNameLst>
+                                          <p:attrName>ppt_y</p:attrName>
+                                        </p:attrNameLst>
+                                      </p:cBhvr>
+                                      <p:tavLst>
+                                        <p:tav tm="0">
+                                          <p:val>
+                                            <p:strVal val="#ppt_y+#ppt_h*1.125000"/>
+                                          </p:val>
+                                        </p:tav>
+                                        <p:tav tm="100000">
+                                          <p:val>
+                                            <p:strVal val="#ppt_y"/>
+                                          </p:val>
+                                        </p:tav>
+                                      </p:tavLst>
+                                    </p:anim>
+                                    <p:animEffect transition="in" filter="wipe(up)">
+                                      <p:cBhvr>
+                                        <p:cTn id="8" dur="500"/>
+                                        <p:tgtEl>
+                                          <p:spTgt spid="3">
+                                            <p:txEl>
+                                              <p:pRg st="0" end="0"/>
+                                            </p:txEl>
+                                          </p:spTgt>
+                                        </p:tgtEl>
+                                      </p:cBhvr>
+                                    </p:animEffect>
+                                  </p:childTnLst>
+                                </p:cTn>
+                              </p:par>
+                            </p:childTnLst>
+                          </p:cTn>
+                        </p:par>
+                      </p:childTnLst>
+                    </p:cTn>
+                  </p:par>
+                  <p:par>
+                    <p:cTn id="9" fill="hold">
+                      <p:stCondLst>
+                        <p:cond delay="indefinite"/>
+                      </p:stCondLst>
+                      <p:childTnLst>
+                        <p:par>
+                          <p:cTn id="10" fill="hold">
+                            <p:stCondLst>
+                              <p:cond delay="0"/>
+                            </p:stCondLst>
+                            <p:childTnLst>
+                              <p:par>
+                                <p:cTn id="11" presetID="12" presetClass="entr" presetSubtype="4" fill="hold" grpId="0" nodeType="clickEffect">
+                                  <p:stCondLst>
+                                    <p:cond delay="0"/>
+                                  </p:stCondLst>
+                                  <p:childTnLst>
+                                    <p:set>
+                                      <p:cBhvr>
+                                        <p:cTn id="12" dur="1" fill="hold">
+                                          <p:stCondLst>
+                                            <p:cond delay="0"/>
+                                          </p:stCondLst>
+                                        </p:cTn>
+                                        <p:tgtEl>
+                                          <p:spTgt spid="3">
+                                            <p:txEl>
+                                              <p:pRg st="1" end="1"/>
+                                            </p:txEl>
+                                          </p:spTgt>
+                                        </p:tgtEl>
+                                        <p:attrNameLst>
+                                          <p:attrName>style.visibility</p:attrName>
+                                        </p:attrNameLst>
+                                      </p:cBhvr>
+                                      <p:to>
+                                        <p:strVal val="visible"/>
+                                      </p:to>
+                                    </p:set>
+                                    <p:anim calcmode="lin" valueType="num">
+                                      <p:cBhvr additive="base">
+                                        <p:cTn id="13" dur="500"/>
+                                        <p:tgtEl>
+                                          <p:spTgt spid="3">
+                                            <p:txEl>
+                                              <p:pRg st="1" end="1"/>
+                                            </p:txEl>
+                                          </p:spTgt>
+                                        </p:tgtEl>
+                                        <p:attrNameLst>
+                                          <p:attrName>ppt_y</p:attrName>
+                                        </p:attrNameLst>
+                                      </p:cBhvr>
+                                      <p:tavLst>
+                                        <p:tav tm="0">
+                                          <p:val>
+                                            <p:strVal val="#ppt_y+#ppt_h*1.125000"/>
+                                          </p:val>
+                                        </p:tav>
+                                        <p:tav tm="100000">
+                                          <p:val>
+                                            <p:strVal val="#ppt_y"/>
+                                          </p:val>
+                                        </p:tav>
+                                      </p:tavLst>
+                                    </p:anim>
+                                    <p:animEffect transition="in" filter="wipe(up)">
+                                      <p:cBhvr>
+                                        <p:cTn id="14" dur="500"/>
+                                        <p:tgtEl>
+                                          <p:spTgt spid="3">
+                                            <p:txEl>
+                                              <p:pRg st="1" end="1"/>
+                                            </p:txEl>
+                                          </p:spTgt>
+                                        </p:tgtEl>
+                                      </p:cBhvr>
+                                    </p:animEffect>
+                                  </p:childTnLst>
+                                </p:cTn>
+                              </p:par>
+                            </p:childTnLst>
+                          </p:cTn>
+                        </p:par>
+                      </p:childTnLst>
+                    </p:cTn>
+                  </p:par>
+                  <p:par>
+                    <p:cTn id="15" fill="hold">
+                      <p:stCondLst>
+                        <p:cond delay="indefinite"/>
+                      </p:stCondLst>
+                      <p:childTnLst>
+                        <p:par>
+                          <p:cTn id="16" fill="hold">
+                            <p:stCondLst>
+                              <p:cond delay="0"/>
+                            </p:stCondLst>
+                            <p:childTnLst>
+                              <p:par>
+                                <p:cTn id="17" presetID="12" presetClass="entr" presetSubtype="4" fill="hold" grpId="0" nodeType="clickEffect">
+                                  <p:stCondLst>
+                                    <p:cond delay="0"/>
+                                  </p:stCondLst>
+                                  <p:childTnLst>
+                                    <p:set>
+                                      <p:cBhvr>
+                                        <p:cTn id="18" dur="1" fill="hold">
+                                          <p:stCondLst>
+                                            <p:cond delay="0"/>
+                                          </p:stCondLst>
+                                        </p:cTn>
+                                        <p:tgtEl>
+                                          <p:spTgt spid="3">
+                                            <p:txEl>
+                                              <p:pRg st="2" end="2"/>
+                                            </p:txEl>
+                                          </p:spTgt>
+                                        </p:tgtEl>
+                                        <p:attrNameLst>
+                                          <p:attrName>style.visibility</p:attrName>
+                                        </p:attrNameLst>
+                                      </p:cBhvr>
+                                      <p:to>
+                                        <p:strVal val="visible"/>
+                                      </p:to>
+                                    </p:set>
+                                    <p:anim calcmode="lin" valueType="num">
+                                      <p:cBhvr additive="base">
+                                        <p:cTn id="19" dur="500"/>
+                                        <p:tgtEl>
+                                          <p:spTgt spid="3">
+                                            <p:txEl>
+                                              <p:pRg st="2" end="2"/>
+                                            </p:txEl>
+                                          </p:spTgt>
+                                        </p:tgtEl>
+                                        <p:attrNameLst>
+                                          <p:attrName>ppt_y</p:attrName>
+                                        </p:attrNameLst>
+                                      </p:cBhvr>
+                                      <p:tavLst>
+                                        <p:tav tm="0">
+                                          <p:val>
+                                            <p:strVal val="#ppt_y+#ppt_h*1.125000"/>
+                                          </p:val>
+                                        </p:tav>
+                                        <p:tav tm="100000">
+                                          <p:val>
+                                            <p:strVal val="#ppt_y"/>
+                                          </p:val>
+                                        </p:tav>
+                                      </p:tavLst>
+                                    </p:anim>
+                                    <p:animEffect transition="in" filter="wipe(up)">
+                                      <p:cBhvr>
+                                        <p:cTn id="20" dur="500"/>
+                                        <p:tgtEl>
+                                          <p:spTgt spid="3">
+                                            <p:txEl>
+                                              <p:pRg st="2" end="2"/>
+                                            </p:txEl>
+                                          </p:spTgt>
+                                        </p:tgtEl>
+                                      </p:cBhvr>
+                                    </p:animEffect>
+                                  </p:childTnLst>
+                                </p:cTn>
+                              </p:par>
+                            </p:childTnLst>
+                          </p:cTn>
+                        </p:par>
+                      </p:childTnLst>
+                    </p:cTn>
+                  </p:par>
+                  <p:par>
+                    <p:cTn id="21" fill="hold">
+                      <p:stCondLst>
+                        <p:cond delay="indefinite"/>
+                      </p:stCondLst>
+                      <p:childTnLst>
+                        <p:par>
+                          <p:cTn id="22" fill="hold">
+                            <p:stCondLst>
+                              <p:cond delay="0"/>
+                            </p:stCondLst>
+                            <p:childTnLst>
+                              <p:par>
+                                <p:cTn id="23" presetID="12" presetClass="entr" presetSubtype="4" fill="hold" grpId="0" nodeType="clickEffect">
+                                  <p:stCondLst>
+                                    <p:cond delay="0"/>
+                                  </p:stCondLst>
+                                  <p:childTnLst>
+                                    <p:set>
+                                      <p:cBhvr>
+                                        <p:cTn id="24" dur="1" fill="hold">
+                                          <p:stCondLst>
+                                            <p:cond delay="0"/>
+                                          </p:stCondLst>
+                                        </p:cTn>
+                                        <p:tgtEl>
+                                          <p:spTgt spid="3">
+                                            <p:txEl>
+                                              <p:pRg st="3" end="3"/>
+                                            </p:txEl>
+                                          </p:spTgt>
+                                        </p:tgtEl>
+                                        <p:attrNameLst>
+                                          <p:attrName>style.visibility</p:attrName>
+                                        </p:attrNameLst>
+                                      </p:cBhvr>
+                                      <p:to>
+                                        <p:strVal val="visible"/>
+                                      </p:to>
+                                    </p:set>
+                                    <p:anim calcmode="lin" valueType="num">
+                                      <p:cBhvr additive="base">
+                                        <p:cTn id="25" dur="500"/>
+                                        <p:tgtEl>
+                                          <p:spTgt spid="3">
+                                            <p:txEl>
+                                              <p:pRg st="3" end="3"/>
+                                            </p:txEl>
+                                          </p:spTgt>
+                                        </p:tgtEl>
+                                        <p:attrNameLst>
+                                          <p:attrName>ppt_y</p:attrName>
+                                        </p:attrNameLst>
+                                      </p:cBhvr>
+                                      <p:tavLst>
+                                        <p:tav tm="0">
+                                          <p:val>
+                                            <p:strVal val="#ppt_y+#ppt_h*1.125000"/>
+                                          </p:val>
+                                        </p:tav>
+                                        <p:tav tm="100000">
+                                          <p:val>
+                                            <p:strVal val="#ppt_y"/>
+                                          </p:val>
+                                        </p:tav>
+                                      </p:tavLst>
+                                    </p:anim>
+                                    <p:animEffect transition="in" filter="wipe(up)">
+                                      <p:cBhvr>
+                                        <p:cTn id="26" dur="500"/>
+                                        <p:tgtEl>
+                                          <p:spTgt spid="3">
+                                            <p:txEl>
+                                              <p:pRg st="3" end="3"/>
+                                            </p:txEl>
+                                          </p:spTgt>
+                                        </p:tgtEl>
+                                      </p:cBhvr>
+                                    </p:animEffect>
+                                  </p:childTnLst>
+                                </p:cTn>
+                              </p:par>
+                              <p:par>
+                                <p:cTn id="27" presetID="12" presetClass="entr" presetSubtype="4" fill="hold" grpId="0" nodeType="withEffect">
+                                  <p:stCondLst>
+                                    <p:cond delay="0"/>
+                                  </p:stCondLst>
+                                  <p:childTnLst>
+                                    <p:set>
+                                      <p:cBhvr>
+                                        <p:cTn id="28" dur="1" fill="hold">
+                                          <p:stCondLst>
+                                            <p:cond delay="0"/>
+                                          </p:stCondLst>
+                                        </p:cTn>
+                                        <p:tgtEl>
+                                          <p:spTgt spid="3">
+                                            <p:txEl>
+                                              <p:pRg st="4" end="4"/>
+                                            </p:txEl>
+                                          </p:spTgt>
+                                        </p:tgtEl>
+                                        <p:attrNameLst>
+                                          <p:attrName>style.visibility</p:attrName>
+                                        </p:attrNameLst>
+                                      </p:cBhvr>
+                                      <p:to>
+                                        <p:strVal val="visible"/>
+                                      </p:to>
+                                    </p:set>
+                                    <p:anim calcmode="lin" valueType="num">
+                                      <p:cBhvr additive="base">
+                                        <p:cTn id="29" dur="500"/>
+                                        <p:tgtEl>
+                                          <p:spTgt spid="3">
+                                            <p:txEl>
+                                              <p:pRg st="4" end="4"/>
+                                            </p:txEl>
+                                          </p:spTgt>
+                                        </p:tgtEl>
+                                        <p:attrNameLst>
+                                          <p:attrName>ppt_y</p:attrName>
+                                        </p:attrNameLst>
+                                      </p:cBhvr>
+                                      <p:tavLst>
+                                        <p:tav tm="0">
+                                          <p:val>
+                                            <p:strVal val="#ppt_y+#ppt_h*1.125000"/>
+                                          </p:val>
+                                        </p:tav>
+                                        <p:tav tm="100000">
+                                          <p:val>
+                                            <p:strVal val="#ppt_y"/>
+                                          </p:val>
+                                        </p:tav>
+                                      </p:tavLst>
+                                    </p:anim>
+                                    <p:animEffect transition="in" filter="wipe(up)">
+                                      <p:cBhvr>
+                                        <p:cTn id="30" dur="500"/>
+                                        <p:tgtEl>
+                                          <p:spTgt spid="3">
+                                            <p:txEl>
+                                              <p:pRg st="4" end="4"/>
+                                            </p:txEl>
+                                          </p:spTgt>
+                                        </p:tgtEl>
+                                      </p:cBhvr>
+                                    </p:animEffect>
+                                  </p:childTnLst>
+                                </p:cTn>
+                              </p:par>
+                            </p:childTnLst>
+                          </p:cTn>
+                        </p:par>
+                      </p:childTnLst>
+                    </p:cTn>
+                  </p:par>
+                </p:childTnLst>
+              </p:cTn>
+              <p:prevCondLst>
+                <p:cond evt="onPrev" delay="0">
+                  <p:tgtEl>
+                    <p:sldTgt/>
+                  </p:tgtEl>
+                </p:cond>
+              </p:prevCondLst>
+              <p:nextCondLst>
+                <p:cond evt="onNext" delay="0">
+                  <p:tgtEl>
+                    <p:sldTgt/>
+                  </p:tgtEl>
+                </p:cond>
+              </p:nextCondLst>
+            </p:seq>
+          </p:childTnLst>
+        </p:cTn>
+      </p:par>
+    </p:tnLst>
+    <p:bldLst>
+      <p:bldP spid="3" grpId="0" uiExpand="1" build="p"/>
+    </p:bldLst>
+  </p:timing>
+</p:sld>
+</file>
+
+<file path=ppt/slides/slide4.xml><?xml version="1.0" encoding="utf-8"?>
+<p:sld xmlns:a="http://schemas.openxmlformats.org/drawingml/2006/main" xmlns:r="http://schemas.openxmlformats.org/officeDocument/2006/relationships" xmlns:p="http://schemas.openxmlformats.org/presentationml/2006/main">
+  <p:cSld>
+    <p:spTree>
+      <p:nvGrpSpPr>
+        <p:cNvPr id="1" name=""/>
+        <p:cNvGrpSpPr/>
+        <p:nvPr/>
+      </p:nvGrpSpPr>
+      <p:grpSpPr>
+        <a:xfrm>
+          <a:off x="0" y="0"/>
+          <a:ext cx="0" cy="0"/>
+          <a:chOff x="0" y="0"/>
+          <a:chExt cx="0" cy="0"/>
+        </a:xfrm>
+      </p:grpSpPr>
+      <p:sp>
+        <p:nvSpPr>
+          <p:cNvPr id="2" name="Title 1"/>
+          <p:cNvSpPr>
+            <a:spLocks noGrp="1"/>
+          </p:cNvSpPr>
+          <p:nvPr>
+            <p:ph type="title"/>
+          </p:nvPr>
+        </p:nvSpPr>
+        <p:spPr/>
+        <p:txBody>
+          <a:bodyPr/>
+          <a:lstStyle/>
+          <a:p>
+            <a:r>
+              <a:rPr lang="en-US" b="1" dirty="0" smtClean="0"/>
+              <a:t>history</a:t>
+            </a:r>
+            <a:endParaRPr lang="en-US" b="1" dirty="0"/>
+          </a:p>
+        </p:txBody>
+      </p:sp>
+      <p:sp>
+        <p:nvSpPr>
+          <p:cNvPr id="3" name="Content Placeholder 2"/>
+          <p:cNvSpPr>
+            <a:spLocks noGrp="1"/>
+          </p:cNvSpPr>
+          <p:nvPr>
+            <p:ph idx="1"/>
+          </p:nvPr>
+        </p:nvSpPr>
+        <p:spPr/>
+        <p:txBody>
+          <a:bodyPr/>
+          <a:lstStyle/>
+          <a:p>
+            <a:r>
+              <a:rPr lang="en-US" dirty="0" smtClean="0"/>
               <a:t>Rob Eisenberg is awesome</a:t>
             </a:r>
           </a:p>
@@ -6505,23 +7100,13 @@
           <a:p>
             <a:r>
               <a:rPr lang="en-US" dirty="0" smtClean="0"/>
-              <a:t>Goodbye Angular, hello Aurelia!</a:t>
-            </a:r>
-          </a:p>
-          <a:p>
-            <a:pPr lvl="1"/>
+              <a:t>Goodbye Angular, hello Aurelia</a:t>
+            </a:r>
             <a:r>
               <a:rPr lang="en-US" dirty="0" smtClean="0"/>
-              <a:t>The best parts of Angular with the best parts of Caliburn.Micro and </a:t>
-            </a:r>
-            <a:r>
-              <a:rPr lang="en-US" dirty="0" err="1" smtClean="0"/>
-              <a:t>Durandal</a:t>
+              <a:t>!</a:t>
             </a:r>
             <a:endParaRPr lang="en-US" dirty="0" smtClean="0"/>
-          </a:p>
-          <a:p>
-            <a:endParaRPr lang="en-US" dirty="0"/>
           </a:p>
         </p:txBody>
       </p:sp>
@@ -7272,76 +7857,6 @@
                                   </p:childTnLst>
                                 </p:cTn>
                               </p:par>
-                              <p:par>
-                                <p:cTn id="49" presetID="12" presetClass="entr" presetSubtype="4" fill="hold" grpId="0" nodeType="withEffect">
-                                  <p:stCondLst>
-                                    <p:cond delay="0"/>
-                                  </p:stCondLst>
-                                  <p:childTnLst>
-                                    <p:set>
-                                      <p:cBhvr>
-                                        <p:cTn id="50" dur="1" fill="hold">
-                                          <p:stCondLst>
-                                            <p:cond delay="0"/>
-                                          </p:stCondLst>
-                                        </p:cTn>
-                                        <p:tgtEl>
-                                          <p:spTgt spid="3">
-                                            <p:txEl>
-                                              <p:pRg st="9" end="9"/>
-                                            </p:txEl>
-                                          </p:spTgt>
-                                        </p:tgtEl>
-                                        <p:attrNameLst>
-                                          <p:attrName>style.visibility</p:attrName>
-                                        </p:attrNameLst>
-                                      </p:cBhvr>
-                                      <p:to>
-                                        <p:strVal val="visible"/>
-                                      </p:to>
-                                    </p:set>
-                                    <p:anim calcmode="lin" valueType="num">
-                                      <p:cBhvr additive="base">
-                                        <p:cTn id="51" dur="500"/>
-                                        <p:tgtEl>
-                                          <p:spTgt spid="3">
-                                            <p:txEl>
-                                              <p:pRg st="9" end="9"/>
-                                            </p:txEl>
-                                          </p:spTgt>
-                                        </p:tgtEl>
-                                        <p:attrNameLst>
-                                          <p:attrName>ppt_y</p:attrName>
-                                        </p:attrNameLst>
-                                      </p:cBhvr>
-                                      <p:tavLst>
-                                        <p:tav tm="0">
-                                          <p:val>
-                                            <p:strVal val="#ppt_y+#ppt_h*1.125000"/>
-                                          </p:val>
-                                        </p:tav>
-                                        <p:tav tm="100000">
-                                          <p:val>
-                                            <p:strVal val="#ppt_y"/>
-                                          </p:val>
-                                        </p:tav>
-                                      </p:tavLst>
-                                    </p:anim>
-                                    <p:animEffect transition="in" filter="wipe(up)">
-                                      <p:cBhvr>
-                                        <p:cTn id="52" dur="500"/>
-                                        <p:tgtEl>
-                                          <p:spTgt spid="3">
-                                            <p:txEl>
-                                              <p:pRg st="9" end="9"/>
-                                            </p:txEl>
-                                          </p:spTgt>
-                                        </p:tgtEl>
-                                      </p:cBhvr>
-                                    </p:animEffect>
-                                  </p:childTnLst>
-                                </p:cTn>
-                              </p:par>
                             </p:childTnLst>
                           </p:cTn>
                         </p:par>
@@ -7376,7 +7891,7 @@
 </p:sld>
 </file>
 
-<file path=ppt/slides/slide4.xml><?xml version="1.0" encoding="utf-8"?>
+<file path=ppt/slides/slide5.xml><?xml version="1.0" encoding="utf-8"?>
 <p:sld xmlns:a="http://schemas.openxmlformats.org/drawingml/2006/main" xmlns:r="http://schemas.openxmlformats.org/officeDocument/2006/relationships" xmlns:p="http://schemas.openxmlformats.org/presentationml/2006/main">
   <p:cSld>
     <p:spTree>
@@ -7489,11 +8004,7 @@
           <a:p>
             <a:r>
               <a:rPr lang="en-US" dirty="0" smtClean="0"/>
-              <a:t>Vs. Angular 2.0?  Listen to Rob on the Herding </a:t>
-            </a:r>
-            <a:r>
-              <a:rPr lang="en-US" smtClean="0"/>
-              <a:t>Code Podcast</a:t>
+              <a:t>Vs. Angular 2.0?  Listen to Rob on the Herding Code Podcast</a:t>
             </a:r>
             <a:endParaRPr lang="en-US" dirty="0" smtClean="0"/>
           </a:p>
@@ -8267,7 +8778,7 @@
 </p:sld>
 </file>
 
-<file path=ppt/slides/slide5.xml><?xml version="1.0" encoding="utf-8"?>
+<file path=ppt/slides/slide6.xml><?xml version="1.0" encoding="utf-8"?>
 <p:sld xmlns:a="http://schemas.openxmlformats.org/drawingml/2006/main" xmlns:r="http://schemas.openxmlformats.org/officeDocument/2006/relationships" xmlns:p="http://schemas.openxmlformats.org/presentationml/2006/main">
   <p:cSld>
     <p:spTree>
@@ -8360,7 +8871,7 @@
 </p:sld>
 </file>
 
-<file path=ppt/slides/slide6.xml><?xml version="1.0" encoding="utf-8"?>
+<file path=ppt/slides/slide7.xml><?xml version="1.0" encoding="utf-8"?>
 <p:sld xmlns:a="http://schemas.openxmlformats.org/drawingml/2006/main" xmlns:r="http://schemas.openxmlformats.org/officeDocument/2006/relationships" xmlns:p="http://schemas.openxmlformats.org/presentationml/2006/main">
   <p:cSld>
     <p:spTree>

</xml_diff>